<commit_message>
Clean and update pentagons
</commit_message>
<xml_diff>
--- a/docs/assets/fractals/pentagons/microbe.pptx
+++ b/docs/assets/fractals/pentagons/microbe.pptx
@@ -2,12 +2,12 @@
 <file path=ppt/presentation.xml><?xml version="1.0" encoding="utf-8"?>
 <p:presentation xmlns:a="http://schemas.openxmlformats.org/drawingml/2006/main" xmlns:r="http://schemas.openxmlformats.org/officeDocument/2006/relationships" xmlns:p="http://schemas.openxmlformats.org/presentationml/2006/main" saveSubsetFonts="1" autoCompressPictures="0">
   <p:sldMasterIdLst>
-    <p:sldMasterId id="2147483660" r:id="rId1"/>
+    <p:sldMasterId id="2147483672" r:id="rId1"/>
   </p:sldMasterIdLst>
   <p:sldIdLst>
     <p:sldId id="256" r:id="rId2"/>
   </p:sldIdLst>
-  <p:sldSz cx="8640763" cy="8640763"/>
+  <p:sldSz cx="8640763" cy="8345488"/>
   <p:notesSz cx="6858000" cy="9144000"/>
   <p:defaultTextStyle>
     <a:defPPr>
@@ -141,8 +141,8 @@
         </p:nvSpPr>
         <p:spPr>
           <a:xfrm>
-            <a:off x="648057" y="1414125"/>
-            <a:ext cx="7344649" cy="3008266"/>
+            <a:off x="648057" y="1365802"/>
+            <a:ext cx="7344649" cy="2905466"/>
           </a:xfrm>
         </p:spPr>
         <p:txBody>
@@ -173,8 +173,8 @@
         </p:nvSpPr>
         <p:spPr>
           <a:xfrm>
-            <a:off x="1080096" y="4538401"/>
-            <a:ext cx="6480572" cy="2086184"/>
+            <a:off x="1080096" y="4383314"/>
+            <a:ext cx="6480572" cy="2014894"/>
           </a:xfrm>
         </p:spPr>
         <p:txBody>
@@ -243,7 +243,7 @@
           <a:p>
             <a:fld id="{A24B4596-C42D-1049-8F16-B297CC03CE11}" type="datetimeFigureOut">
               <a:rPr lang="en-GB" smtClean="0"/>
-              <a:t>04/08/2024</a:t>
+              <a:t>19/08/2024</a:t>
             </a:fld>
             <a:endParaRPr lang="en-GB"/>
           </a:p>
@@ -294,7 +294,7 @@
     </p:spTree>
     <p:extLst>
       <p:ext uri="{BB962C8B-B14F-4D97-AF65-F5344CB8AC3E}">
-        <p14:creationId xmlns:p14="http://schemas.microsoft.com/office/powerpoint/2010/main" val="3503335581"/>
+        <p14:creationId xmlns:p14="http://schemas.microsoft.com/office/powerpoint/2010/main" val="2994344953"/>
       </p:ext>
     </p:extLst>
   </p:cSld>
@@ -413,7 +413,7 @@
           <a:p>
             <a:fld id="{A24B4596-C42D-1049-8F16-B297CC03CE11}" type="datetimeFigureOut">
               <a:rPr lang="en-GB" smtClean="0"/>
-              <a:t>04/08/2024</a:t>
+              <a:t>19/08/2024</a:t>
             </a:fld>
             <a:endParaRPr lang="en-GB"/>
           </a:p>
@@ -464,7 +464,7 @@
     </p:spTree>
     <p:extLst>
       <p:ext uri="{BB962C8B-B14F-4D97-AF65-F5344CB8AC3E}">
-        <p14:creationId xmlns:p14="http://schemas.microsoft.com/office/powerpoint/2010/main" val="1884937923"/>
+        <p14:creationId xmlns:p14="http://schemas.microsoft.com/office/powerpoint/2010/main" val="3253596129"/>
       </p:ext>
     </p:extLst>
   </p:cSld>
@@ -503,8 +503,8 @@
         </p:nvSpPr>
         <p:spPr>
           <a:xfrm>
-            <a:off x="6183546" y="460041"/>
-            <a:ext cx="1863165" cy="7322647"/>
+            <a:off x="6183546" y="444320"/>
+            <a:ext cx="1863165" cy="7072415"/>
           </a:xfrm>
         </p:spPr>
         <p:txBody>
@@ -531,8 +531,8 @@
         </p:nvSpPr>
         <p:spPr>
           <a:xfrm>
-            <a:off x="594053" y="460041"/>
-            <a:ext cx="5481484" cy="7322647"/>
+            <a:off x="594053" y="444320"/>
+            <a:ext cx="5481484" cy="7072415"/>
           </a:xfrm>
         </p:spPr>
         <p:txBody>
@@ -593,7 +593,7 @@
           <a:p>
             <a:fld id="{A24B4596-C42D-1049-8F16-B297CC03CE11}" type="datetimeFigureOut">
               <a:rPr lang="en-GB" smtClean="0"/>
-              <a:t>04/08/2024</a:t>
+              <a:t>19/08/2024</a:t>
             </a:fld>
             <a:endParaRPr lang="en-GB"/>
           </a:p>
@@ -644,7 +644,7 @@
     </p:spTree>
     <p:extLst>
       <p:ext uri="{BB962C8B-B14F-4D97-AF65-F5344CB8AC3E}">
-        <p14:creationId xmlns:p14="http://schemas.microsoft.com/office/powerpoint/2010/main" val="875648627"/>
+        <p14:creationId xmlns:p14="http://schemas.microsoft.com/office/powerpoint/2010/main" val="1653821402"/>
       </p:ext>
     </p:extLst>
   </p:cSld>
@@ -763,7 +763,7 @@
           <a:p>
             <a:fld id="{A24B4596-C42D-1049-8F16-B297CC03CE11}" type="datetimeFigureOut">
               <a:rPr lang="en-GB" smtClean="0"/>
-              <a:t>04/08/2024</a:t>
+              <a:t>19/08/2024</a:t>
             </a:fld>
             <a:endParaRPr lang="en-GB"/>
           </a:p>
@@ -814,7 +814,7 @@
     </p:spTree>
     <p:extLst>
       <p:ext uri="{BB962C8B-B14F-4D97-AF65-F5344CB8AC3E}">
-        <p14:creationId xmlns:p14="http://schemas.microsoft.com/office/powerpoint/2010/main" val="1442564615"/>
+        <p14:creationId xmlns:p14="http://schemas.microsoft.com/office/powerpoint/2010/main" val="3512235179"/>
       </p:ext>
     </p:extLst>
   </p:cSld>
@@ -853,8 +853,8 @@
         </p:nvSpPr>
         <p:spPr>
           <a:xfrm>
-            <a:off x="589553" y="2154193"/>
-            <a:ext cx="7452658" cy="3594317"/>
+            <a:off x="589553" y="2080579"/>
+            <a:ext cx="7452658" cy="3471491"/>
           </a:xfrm>
         </p:spPr>
         <p:txBody>
@@ -885,8 +885,8 @@
         </p:nvSpPr>
         <p:spPr>
           <a:xfrm>
-            <a:off x="589553" y="5782513"/>
-            <a:ext cx="7452658" cy="1890166"/>
+            <a:off x="589553" y="5584911"/>
+            <a:ext cx="7452658" cy="1825575"/>
           </a:xfrm>
         </p:spPr>
         <p:txBody>
@@ -1007,7 +1007,7 @@
           <a:p>
             <a:fld id="{A24B4596-C42D-1049-8F16-B297CC03CE11}" type="datetimeFigureOut">
               <a:rPr lang="en-GB" smtClean="0"/>
-              <a:t>04/08/2024</a:t>
+              <a:t>19/08/2024</a:t>
             </a:fld>
             <a:endParaRPr lang="en-GB"/>
           </a:p>
@@ -1058,7 +1058,7 @@
     </p:spTree>
     <p:extLst>
       <p:ext uri="{BB962C8B-B14F-4D97-AF65-F5344CB8AC3E}">
-        <p14:creationId xmlns:p14="http://schemas.microsoft.com/office/powerpoint/2010/main" val="1817688196"/>
+        <p14:creationId xmlns:p14="http://schemas.microsoft.com/office/powerpoint/2010/main" val="2275841354"/>
       </p:ext>
     </p:extLst>
   </p:cSld>
@@ -1120,8 +1120,8 @@
         </p:nvSpPr>
         <p:spPr>
           <a:xfrm>
-            <a:off x="594053" y="2300203"/>
-            <a:ext cx="3672324" cy="5482485"/>
+            <a:off x="594053" y="2221600"/>
+            <a:ext cx="3672324" cy="5295135"/>
           </a:xfrm>
         </p:spPr>
         <p:txBody>
@@ -1177,8 +1177,8 @@
         </p:nvSpPr>
         <p:spPr>
           <a:xfrm>
-            <a:off x="4374386" y="2300203"/>
-            <a:ext cx="3672324" cy="5482485"/>
+            <a:off x="4374386" y="2221600"/>
+            <a:ext cx="3672324" cy="5295135"/>
           </a:xfrm>
         </p:spPr>
         <p:txBody>
@@ -1239,7 +1239,7 @@
           <a:p>
             <a:fld id="{A24B4596-C42D-1049-8F16-B297CC03CE11}" type="datetimeFigureOut">
               <a:rPr lang="en-GB" smtClean="0"/>
-              <a:t>04/08/2024</a:t>
+              <a:t>19/08/2024</a:t>
             </a:fld>
             <a:endParaRPr lang="en-GB"/>
           </a:p>
@@ -1290,7 +1290,7 @@
     </p:spTree>
     <p:extLst>
       <p:ext uri="{BB962C8B-B14F-4D97-AF65-F5344CB8AC3E}">
-        <p14:creationId xmlns:p14="http://schemas.microsoft.com/office/powerpoint/2010/main" val="51547415"/>
+        <p14:creationId xmlns:p14="http://schemas.microsoft.com/office/powerpoint/2010/main" val="2132137816"/>
       </p:ext>
     </p:extLst>
   </p:cSld>
@@ -1329,8 +1329,8 @@
         </p:nvSpPr>
         <p:spPr>
           <a:xfrm>
-            <a:off x="595178" y="460043"/>
-            <a:ext cx="7452658" cy="1670148"/>
+            <a:off x="595178" y="444322"/>
+            <a:ext cx="7452658" cy="1613075"/>
           </a:xfrm>
         </p:spPr>
         <p:txBody>
@@ -1357,8 +1357,8 @@
         </p:nvSpPr>
         <p:spPr>
           <a:xfrm>
-            <a:off x="595179" y="2118188"/>
-            <a:ext cx="3655447" cy="1038091"/>
+            <a:off x="595179" y="2045804"/>
+            <a:ext cx="3655447" cy="1002617"/>
           </a:xfrm>
         </p:spPr>
         <p:txBody>
@@ -1422,8 +1422,8 @@
         </p:nvSpPr>
         <p:spPr>
           <a:xfrm>
-            <a:off x="595179" y="3156278"/>
-            <a:ext cx="3655447" cy="4642411"/>
+            <a:off x="595179" y="3048421"/>
+            <a:ext cx="3655447" cy="4483769"/>
           </a:xfrm>
         </p:spPr>
         <p:txBody>
@@ -1479,8 +1479,8 @@
         </p:nvSpPr>
         <p:spPr>
           <a:xfrm>
-            <a:off x="4374387" y="2118188"/>
-            <a:ext cx="3673450" cy="1038091"/>
+            <a:off x="4374387" y="2045804"/>
+            <a:ext cx="3673450" cy="1002617"/>
           </a:xfrm>
         </p:spPr>
         <p:txBody>
@@ -1544,8 +1544,8 @@
         </p:nvSpPr>
         <p:spPr>
           <a:xfrm>
-            <a:off x="4374387" y="3156278"/>
-            <a:ext cx="3673450" cy="4642411"/>
+            <a:off x="4374387" y="3048421"/>
+            <a:ext cx="3673450" cy="4483769"/>
           </a:xfrm>
         </p:spPr>
         <p:txBody>
@@ -1606,7 +1606,7 @@
           <a:p>
             <a:fld id="{A24B4596-C42D-1049-8F16-B297CC03CE11}" type="datetimeFigureOut">
               <a:rPr lang="en-GB" smtClean="0"/>
-              <a:t>04/08/2024</a:t>
+              <a:t>19/08/2024</a:t>
             </a:fld>
             <a:endParaRPr lang="en-GB"/>
           </a:p>
@@ -1657,7 +1657,7 @@
     </p:spTree>
     <p:extLst>
       <p:ext uri="{BB962C8B-B14F-4D97-AF65-F5344CB8AC3E}">
-        <p14:creationId xmlns:p14="http://schemas.microsoft.com/office/powerpoint/2010/main" val="319103307"/>
+        <p14:creationId xmlns:p14="http://schemas.microsoft.com/office/powerpoint/2010/main" val="2096414409"/>
       </p:ext>
     </p:extLst>
   </p:cSld>
@@ -1724,7 +1724,7 @@
           <a:p>
             <a:fld id="{A24B4596-C42D-1049-8F16-B297CC03CE11}" type="datetimeFigureOut">
               <a:rPr lang="en-GB" smtClean="0"/>
-              <a:t>04/08/2024</a:t>
+              <a:t>19/08/2024</a:t>
             </a:fld>
             <a:endParaRPr lang="en-GB"/>
           </a:p>
@@ -1775,7 +1775,7 @@
     </p:spTree>
     <p:extLst>
       <p:ext uri="{BB962C8B-B14F-4D97-AF65-F5344CB8AC3E}">
-        <p14:creationId xmlns:p14="http://schemas.microsoft.com/office/powerpoint/2010/main" val="1420026467"/>
+        <p14:creationId xmlns:p14="http://schemas.microsoft.com/office/powerpoint/2010/main" val="3377693588"/>
       </p:ext>
     </p:extLst>
   </p:cSld>
@@ -1819,7 +1819,7 @@
           <a:p>
             <a:fld id="{A24B4596-C42D-1049-8F16-B297CC03CE11}" type="datetimeFigureOut">
               <a:rPr lang="en-GB" smtClean="0"/>
-              <a:t>04/08/2024</a:t>
+              <a:t>19/08/2024</a:t>
             </a:fld>
             <a:endParaRPr lang="en-GB"/>
           </a:p>
@@ -1870,7 +1870,7 @@
     </p:spTree>
     <p:extLst>
       <p:ext uri="{BB962C8B-B14F-4D97-AF65-F5344CB8AC3E}">
-        <p14:creationId xmlns:p14="http://schemas.microsoft.com/office/powerpoint/2010/main" val="4126026371"/>
+        <p14:creationId xmlns:p14="http://schemas.microsoft.com/office/powerpoint/2010/main" val="2913285617"/>
       </p:ext>
     </p:extLst>
   </p:cSld>
@@ -1909,8 +1909,8 @@
         </p:nvSpPr>
         <p:spPr>
           <a:xfrm>
-            <a:off x="595178" y="576051"/>
-            <a:ext cx="2786871" cy="2016178"/>
+            <a:off x="595178" y="556366"/>
+            <a:ext cx="2786871" cy="1947281"/>
           </a:xfrm>
         </p:spPr>
         <p:txBody>
@@ -1941,8 +1941,8 @@
         </p:nvSpPr>
         <p:spPr>
           <a:xfrm>
-            <a:off x="3673450" y="1244112"/>
-            <a:ext cx="4374386" cy="6140542"/>
+            <a:off x="3673450" y="1201597"/>
+            <a:ext cx="4374386" cy="5930706"/>
           </a:xfrm>
         </p:spPr>
         <p:txBody>
@@ -2026,8 +2026,8 @@
         </p:nvSpPr>
         <p:spPr>
           <a:xfrm>
-            <a:off x="595178" y="2592229"/>
-            <a:ext cx="2786871" cy="4802425"/>
+            <a:off x="595178" y="2503646"/>
+            <a:ext cx="2786871" cy="4638315"/>
           </a:xfrm>
         </p:spPr>
         <p:txBody>
@@ -2096,7 +2096,7 @@
           <a:p>
             <a:fld id="{A24B4596-C42D-1049-8F16-B297CC03CE11}" type="datetimeFigureOut">
               <a:rPr lang="en-GB" smtClean="0"/>
-              <a:t>04/08/2024</a:t>
+              <a:t>19/08/2024</a:t>
             </a:fld>
             <a:endParaRPr lang="en-GB"/>
           </a:p>
@@ -2147,7 +2147,7 @@
     </p:spTree>
     <p:extLst>
       <p:ext uri="{BB962C8B-B14F-4D97-AF65-F5344CB8AC3E}">
-        <p14:creationId xmlns:p14="http://schemas.microsoft.com/office/powerpoint/2010/main" val="2479668884"/>
+        <p14:creationId xmlns:p14="http://schemas.microsoft.com/office/powerpoint/2010/main" val="1568471605"/>
       </p:ext>
     </p:extLst>
   </p:cSld>
@@ -2186,8 +2186,8 @@
         </p:nvSpPr>
         <p:spPr>
           <a:xfrm>
-            <a:off x="595178" y="576051"/>
-            <a:ext cx="2786871" cy="2016178"/>
+            <a:off x="595178" y="556366"/>
+            <a:ext cx="2786871" cy="1947281"/>
           </a:xfrm>
         </p:spPr>
         <p:txBody>
@@ -2218,8 +2218,8 @@
         </p:nvSpPr>
         <p:spPr>
           <a:xfrm>
-            <a:off x="3673450" y="1244112"/>
-            <a:ext cx="4374386" cy="6140542"/>
+            <a:off x="3673450" y="1201597"/>
+            <a:ext cx="4374386" cy="5930706"/>
           </a:xfrm>
         </p:spPr>
         <p:txBody>
@@ -2283,8 +2283,8 @@
         </p:nvSpPr>
         <p:spPr>
           <a:xfrm>
-            <a:off x="595178" y="2592229"/>
-            <a:ext cx="2786871" cy="4802425"/>
+            <a:off x="595178" y="2503646"/>
+            <a:ext cx="2786871" cy="4638315"/>
           </a:xfrm>
         </p:spPr>
         <p:txBody>
@@ -2353,7 +2353,7 @@
           <a:p>
             <a:fld id="{A24B4596-C42D-1049-8F16-B297CC03CE11}" type="datetimeFigureOut">
               <a:rPr lang="en-GB" smtClean="0"/>
-              <a:t>04/08/2024</a:t>
+              <a:t>19/08/2024</a:t>
             </a:fld>
             <a:endParaRPr lang="en-GB"/>
           </a:p>
@@ -2404,7 +2404,7 @@
     </p:spTree>
     <p:extLst>
       <p:ext uri="{BB962C8B-B14F-4D97-AF65-F5344CB8AC3E}">
-        <p14:creationId xmlns:p14="http://schemas.microsoft.com/office/powerpoint/2010/main" val="616358138"/>
+        <p14:creationId xmlns:p14="http://schemas.microsoft.com/office/powerpoint/2010/main" val="524376854"/>
       </p:ext>
     </p:extLst>
   </p:cSld>
@@ -2448,8 +2448,8 @@
         </p:nvSpPr>
         <p:spPr>
           <a:xfrm>
-            <a:off x="594053" y="460043"/>
-            <a:ext cx="7452658" cy="1670148"/>
+            <a:off x="594053" y="444322"/>
+            <a:ext cx="7452658" cy="1613075"/>
           </a:xfrm>
           <a:prstGeom prst="rect">
             <a:avLst/>
@@ -2481,8 +2481,8 @@
         </p:nvSpPr>
         <p:spPr>
           <a:xfrm>
-            <a:off x="594053" y="2300203"/>
-            <a:ext cx="7452658" cy="5482485"/>
+            <a:off x="594053" y="2221600"/>
+            <a:ext cx="7452658" cy="5295135"/>
           </a:xfrm>
           <a:prstGeom prst="rect">
             <a:avLst/>
@@ -2543,8 +2543,8 @@
         </p:nvSpPr>
         <p:spPr>
           <a:xfrm>
-            <a:off x="594052" y="8008709"/>
-            <a:ext cx="1944172" cy="460041"/>
+            <a:off x="594052" y="7735033"/>
+            <a:ext cx="1944172" cy="444320"/>
           </a:xfrm>
           <a:prstGeom prst="rect">
             <a:avLst/>
@@ -2566,7 +2566,7 @@
           <a:p>
             <a:fld id="{A24B4596-C42D-1049-8F16-B297CC03CE11}" type="datetimeFigureOut">
               <a:rPr lang="en-GB" smtClean="0"/>
-              <a:t>04/08/2024</a:t>
+              <a:t>19/08/2024</a:t>
             </a:fld>
             <a:endParaRPr lang="en-GB"/>
           </a:p>
@@ -2584,8 +2584,8 @@
         </p:nvSpPr>
         <p:spPr>
           <a:xfrm>
-            <a:off x="2862253" y="8008709"/>
-            <a:ext cx="2916258" cy="460041"/>
+            <a:off x="2862253" y="7735033"/>
+            <a:ext cx="2916258" cy="444320"/>
           </a:xfrm>
           <a:prstGeom prst="rect">
             <a:avLst/>
@@ -2621,8 +2621,8 @@
         </p:nvSpPr>
         <p:spPr>
           <a:xfrm>
-            <a:off x="6102539" y="8008709"/>
-            <a:ext cx="1944172" cy="460041"/>
+            <a:off x="6102539" y="7735033"/>
+            <a:ext cx="1944172" cy="444320"/>
           </a:xfrm>
           <a:prstGeom prst="rect">
             <a:avLst/>
@@ -2653,23 +2653,23 @@
     </p:spTree>
     <p:extLst>
       <p:ext uri="{BB962C8B-B14F-4D97-AF65-F5344CB8AC3E}">
-        <p14:creationId xmlns:p14="http://schemas.microsoft.com/office/powerpoint/2010/main" val="2203090133"/>
+        <p14:creationId xmlns:p14="http://schemas.microsoft.com/office/powerpoint/2010/main" val="1656657752"/>
       </p:ext>
     </p:extLst>
   </p:cSld>
   <p:clrMap bg1="lt1" tx1="dk1" bg2="lt2" tx2="dk2" accent1="accent1" accent2="accent2" accent3="accent3" accent4="accent4" accent5="accent5" accent6="accent6" hlink="hlink" folHlink="folHlink"/>
   <p:sldLayoutIdLst>
-    <p:sldLayoutId id="2147483661" r:id="rId1"/>
-    <p:sldLayoutId id="2147483662" r:id="rId2"/>
-    <p:sldLayoutId id="2147483663" r:id="rId3"/>
-    <p:sldLayoutId id="2147483664" r:id="rId4"/>
-    <p:sldLayoutId id="2147483665" r:id="rId5"/>
-    <p:sldLayoutId id="2147483666" r:id="rId6"/>
-    <p:sldLayoutId id="2147483667" r:id="rId7"/>
-    <p:sldLayoutId id="2147483668" r:id="rId8"/>
-    <p:sldLayoutId id="2147483669" r:id="rId9"/>
-    <p:sldLayoutId id="2147483670" r:id="rId10"/>
-    <p:sldLayoutId id="2147483671" r:id="rId11"/>
+    <p:sldLayoutId id="2147483673" r:id="rId1"/>
+    <p:sldLayoutId id="2147483674" r:id="rId2"/>
+    <p:sldLayoutId id="2147483675" r:id="rId3"/>
+    <p:sldLayoutId id="2147483676" r:id="rId4"/>
+    <p:sldLayoutId id="2147483677" r:id="rId5"/>
+    <p:sldLayoutId id="2147483678" r:id="rId6"/>
+    <p:sldLayoutId id="2147483679" r:id="rId7"/>
+    <p:sldLayoutId id="2147483680" r:id="rId8"/>
+    <p:sldLayoutId id="2147483681" r:id="rId9"/>
+    <p:sldLayoutId id="2147483682" r:id="rId10"/>
+    <p:sldLayoutId id="2147483683" r:id="rId11"/>
   </p:sldLayoutIdLst>
   <p:txStyles>
     <p:titleStyle>
@@ -2971,14 +2971,14 @@
           <a:chExt cx="0" cy="0"/>
         </a:xfrm>
       </p:grpSpPr>
-      <mc:AlternateContent xmlns:mc="http://schemas.openxmlformats.org/markup-compatibility/2006" xmlns:pslz="http://schemas.microsoft.com/office/powerpoint/2016/slidezoom">
-        <mc:Choice Requires="pslz">
+      <mc:AlternateContent xmlns:mc="http://schemas.openxmlformats.org/markup-compatibility/2006">
+        <mc:Choice xmlns:pslz="http://schemas.microsoft.com/office/powerpoint/2016/slidezoom" Requires="pslz">
           <p:graphicFrame>
             <p:nvGraphicFramePr>
-              <p:cNvPr id="7" name="Slide Zoom 6">
+              <p:cNvPr id="4" name="Slide Zoom 3">
                 <a:extLst>
                   <a:ext uri="{FF2B5EF4-FFF2-40B4-BE49-F238E27FC236}">
-                    <a16:creationId xmlns:a16="http://schemas.microsoft.com/office/drawing/2014/main" id="{9A4B2514-DE60-E90E-0753-8651679BB0D2}"/>
+                    <a16:creationId xmlns:a16="http://schemas.microsoft.com/office/drawing/2014/main" id="{76B67CB9-BA08-2F3D-CCFB-7BE9C76BA3A7}"/>
                   </a:ext>
                 </a:extLst>
               </p:cNvPr>
@@ -2988,20 +2988,20 @@
               <p:nvPr>
                 <p:extLst>
                   <p:ext uri="{D42A27DB-BD31-4B8C-83A1-F6EECF244321}">
-                    <p14:modId xmlns:p14="http://schemas.microsoft.com/office/powerpoint/2010/main" val="1236666169"/>
+                    <p14:modId xmlns:p14="http://schemas.microsoft.com/office/powerpoint/2010/main" val="1670848566"/>
                   </p:ext>
                 </p:extLst>
               </p:nvPr>
             </p:nvGraphicFramePr>
-            <p:xfrm flipV="1">
-              <a:off x="4072586" y="4453200"/>
-              <a:ext cx="3240000" cy="3240000"/>
+            <p:xfrm rot="10800000">
+              <a:off x="2671200" y="0"/>
+              <a:ext cx="3301200" cy="3188390"/>
             </p:xfrm>
             <a:graphic>
               <a:graphicData uri="http://schemas.microsoft.com/office/powerpoint/2016/slidezoom">
                 <pslz:sldZm>
                   <pslz:sldZmObj sldId="256" cId="1770594053">
-                    <pslz:zmPr id="{DEB289BA-851F-E94E-B758-5CF50B5A79ED}" returnToParent="0" transitionDur="1000" showBg="0">
+                    <pslz:zmPr id="{A7A323EF-EDCA-1842-93C1-732DEC9324FE}" returnToParent="0" transitionDur="1000" showBg="0">
                       <p166:blipFill xmlns:p166="http://schemas.microsoft.com/office/powerpoint/2016/6/main">
                         <a:blip r:embed="rId2"/>
                         <a:stretch>
@@ -3009,9 +3009,9 @@
                         </a:stretch>
                       </p166:blipFill>
                       <p166:spPr xmlns:p166="http://schemas.microsoft.com/office/powerpoint/2016/6/main">
-                        <a:xfrm flipV="1">
+                        <a:xfrm rot="10800000">
                           <a:off x="0" y="0"/>
-                          <a:ext cx="3240000" cy="3240000"/>
+                          <a:ext cx="3301200" cy="3188390"/>
                         </a:xfrm>
                         <a:prstGeom prst="rect">
                           <a:avLst/>
@@ -3025,14 +3025,103 @@
             </a:graphic>
           </p:graphicFrame>
         </mc:Choice>
-        <mc:Fallback xmlns="">
+        <mc:Fallback>
           <p:pic>
             <p:nvPicPr>
-              <p:cNvPr id="7" name="Slide Zoom 6">
+              <p:cNvPr id="4" name="Slide Zoom 3">
                 <a:hlinkClick r:id="rId3" action="ppaction://hlinksldjump"/>
                 <a:extLst>
                   <a:ext uri="{FF2B5EF4-FFF2-40B4-BE49-F238E27FC236}">
-                    <a16:creationId xmlns:a16="http://schemas.microsoft.com/office/drawing/2014/main" id="{9A4B2514-DE60-E90E-0753-8651679BB0D2}"/>
+                    <a16:creationId xmlns:a16="http://schemas.microsoft.com/office/drawing/2014/main" id="{76B67CB9-BA08-2F3D-CCFB-7BE9C76BA3A7}"/>
+                  </a:ext>
+                </a:extLst>
+              </p:cNvPr>
+              <p:cNvPicPr>
+                <a:picLocks noGrp="1" noRot="1" noChangeAspect="1" noMove="1" noResize="1" noEditPoints="1" noAdjustHandles="1" noChangeArrowheads="1" noChangeShapeType="1"/>
+              </p:cNvPicPr>
+              <p:nvPr/>
+            </p:nvPicPr>
+            <p:blipFill>
+              <a:blip r:embed="rId2"/>
+              <a:stretch>
+                <a:fillRect/>
+              </a:stretch>
+            </p:blipFill>
+            <p:spPr>
+              <a:xfrm rot="10800000">
+                <a:off x="2671200" y="0"/>
+                <a:ext cx="3301200" cy="3188390"/>
+              </a:xfrm>
+              <a:prstGeom prst="rect">
+                <a:avLst/>
+              </a:prstGeom>
+              <a:effectLst/>
+            </p:spPr>
+          </p:pic>
+        </mc:Fallback>
+      </mc:AlternateContent>
+      <mc:AlternateContent xmlns:mc="http://schemas.openxmlformats.org/markup-compatibility/2006">
+        <mc:Choice xmlns:pslz="http://schemas.microsoft.com/office/powerpoint/2016/slidezoom" Requires="pslz">
+          <p:graphicFrame>
+            <p:nvGraphicFramePr>
+              <p:cNvPr id="5" name="Slide Zoom 4">
+                <a:extLst>
+                  <a:ext uri="{FF2B5EF4-FFF2-40B4-BE49-F238E27FC236}">
+                    <a16:creationId xmlns:a16="http://schemas.microsoft.com/office/drawing/2014/main" id="{445B2CC4-A1AB-D77A-BEB8-86DEAAEF4E3C}"/>
+                  </a:ext>
+                </a:extLst>
+              </p:cNvPr>
+              <p:cNvGraphicFramePr>
+                <a:graphicFrameLocks noChangeAspect="1"/>
+              </p:cNvGraphicFramePr>
+              <p:nvPr>
+                <p:extLst>
+                  <p:ext uri="{D42A27DB-BD31-4B8C-83A1-F6EECF244321}">
+                    <p14:modId xmlns:p14="http://schemas.microsoft.com/office/powerpoint/2010/main" val="104213186"/>
+                  </p:ext>
+                </p:extLst>
+              </p:nvPr>
+            </p:nvGraphicFramePr>
+            <p:xfrm rot="10800000">
+              <a:off x="0" y="1969721"/>
+              <a:ext cx="3301200" cy="3188390"/>
+            </p:xfrm>
+            <a:graphic>
+              <a:graphicData uri="http://schemas.microsoft.com/office/powerpoint/2016/slidezoom">
+                <pslz:sldZm>
+                  <pslz:sldZmObj sldId="256" cId="1770594053">
+                    <pslz:zmPr id="{A7A323EF-EDCA-1842-93C1-732DEC9324FE}" returnToParent="0" transitionDur="1000" showBg="0">
+                      <p166:blipFill xmlns:p166="http://schemas.microsoft.com/office/powerpoint/2016/6/main">
+                        <a:blip r:embed="rId4"/>
+                        <a:stretch>
+                          <a:fillRect/>
+                        </a:stretch>
+                      </p166:blipFill>
+                      <p166:spPr xmlns:p166="http://schemas.microsoft.com/office/powerpoint/2016/6/main">
+                        <a:xfrm rot="10800000">
+                          <a:off x="0" y="0"/>
+                          <a:ext cx="3301200" cy="3188390"/>
+                        </a:xfrm>
+                        <a:prstGeom prst="rect">
+                          <a:avLst/>
+                        </a:prstGeom>
+                        <a:effectLst/>
+                      </p166:spPr>
+                    </pslz:zmPr>
+                  </pslz:sldZmObj>
+                </pslz:sldZm>
+              </a:graphicData>
+            </a:graphic>
+          </p:graphicFrame>
+        </mc:Choice>
+        <mc:Fallback>
+          <p:pic>
+            <p:nvPicPr>
+              <p:cNvPr id="5" name="Slide Zoom 4">
+                <a:hlinkClick r:id="rId3" action="ppaction://hlinksldjump"/>
+                <a:extLst>
+                  <a:ext uri="{FF2B5EF4-FFF2-40B4-BE49-F238E27FC236}">
+                    <a16:creationId xmlns:a16="http://schemas.microsoft.com/office/drawing/2014/main" id="{445B2CC4-A1AB-D77A-BEB8-86DEAAEF4E3C}"/>
                   </a:ext>
                 </a:extLst>
               </p:cNvPr>
@@ -3048,9 +3137,9 @@
               </a:stretch>
             </p:blipFill>
             <p:spPr>
-              <a:xfrm flipV="1">
-                <a:off x="4072586" y="4453200"/>
-                <a:ext cx="3240000" cy="3240000"/>
+              <a:xfrm rot="10800000">
+                <a:off x="0" y="1969721"/>
+                <a:ext cx="3301200" cy="3188390"/>
               </a:xfrm>
               <a:prstGeom prst="rect">
                 <a:avLst/>
@@ -3060,14 +3149,14 @@
           </p:pic>
         </mc:Fallback>
       </mc:AlternateContent>
-      <mc:AlternateContent xmlns:mc="http://schemas.openxmlformats.org/markup-compatibility/2006" xmlns:pslz="http://schemas.microsoft.com/office/powerpoint/2016/slidezoom">
-        <mc:Choice Requires="pslz">
+      <mc:AlternateContent xmlns:mc="http://schemas.openxmlformats.org/markup-compatibility/2006">
+        <mc:Choice xmlns:pslz="http://schemas.microsoft.com/office/powerpoint/2016/slidezoom" Requires="pslz">
           <p:graphicFrame>
             <p:nvGraphicFramePr>
-              <p:cNvPr id="8" name="Slide Zoom 7">
+              <p:cNvPr id="11" name="Slide Zoom 10">
                 <a:extLst>
                   <a:ext uri="{FF2B5EF4-FFF2-40B4-BE49-F238E27FC236}">
-                    <a16:creationId xmlns:a16="http://schemas.microsoft.com/office/drawing/2014/main" id="{F5605711-4C17-7D12-676E-3527CC168389}"/>
+                    <a16:creationId xmlns:a16="http://schemas.microsoft.com/office/drawing/2014/main" id="{E0776CBD-83CA-D3BF-A3FF-D5FF11987996}"/>
                   </a:ext>
                 </a:extLst>
               </p:cNvPr>
@@ -3077,20 +3166,20 @@
               <p:nvPr>
                 <p:extLst>
                   <p:ext uri="{D42A27DB-BD31-4B8C-83A1-F6EECF244321}">
-                    <p14:modId xmlns:p14="http://schemas.microsoft.com/office/powerpoint/2010/main" val="2120388524"/>
+                    <p14:modId xmlns:p14="http://schemas.microsoft.com/office/powerpoint/2010/main" val="927611757"/>
                   </p:ext>
                 </p:extLst>
               </p:nvPr>
             </p:nvGraphicFramePr>
-            <p:xfrm flipV="1">
-              <a:off x="1404094" y="4451469"/>
-              <a:ext cx="3240000" cy="3240000"/>
+            <p:xfrm rot="10800000">
+              <a:off x="5338800" y="1969200"/>
+              <a:ext cx="3301200" cy="3188390"/>
             </p:xfrm>
             <a:graphic>
               <a:graphicData uri="http://schemas.microsoft.com/office/powerpoint/2016/slidezoom">
                 <pslz:sldZm>
                   <pslz:sldZmObj sldId="256" cId="1770594053">
-                    <pslz:zmPr id="{DEB289BA-851F-E94E-B758-5CF50B5A79ED}" returnToParent="0" transitionDur="1000" showBg="0">
+                    <pslz:zmPr id="{A7A323EF-EDCA-1842-93C1-732DEC9324FE}" returnToParent="0" transitionDur="1000" showBg="0">
                       <p166:blipFill xmlns:p166="http://schemas.microsoft.com/office/powerpoint/2016/6/main">
                         <a:blip r:embed="rId5"/>
                         <a:stretch>
@@ -3098,9 +3187,9 @@
                         </a:stretch>
                       </p166:blipFill>
                       <p166:spPr xmlns:p166="http://schemas.microsoft.com/office/powerpoint/2016/6/main">
-                        <a:xfrm flipV="1">
+                        <a:xfrm rot="10800000">
                           <a:off x="0" y="0"/>
-                          <a:ext cx="3240000" cy="3240000"/>
+                          <a:ext cx="3301200" cy="3188390"/>
                         </a:xfrm>
                         <a:prstGeom prst="rect">
                           <a:avLst/>
@@ -3114,14 +3203,103 @@
             </a:graphic>
           </p:graphicFrame>
         </mc:Choice>
-        <mc:Fallback xmlns="">
+        <mc:Fallback>
           <p:pic>
             <p:nvPicPr>
-              <p:cNvPr id="8" name="Slide Zoom 7">
+              <p:cNvPr id="11" name="Slide Zoom 10">
                 <a:hlinkClick r:id="rId3" action="ppaction://hlinksldjump"/>
                 <a:extLst>
                   <a:ext uri="{FF2B5EF4-FFF2-40B4-BE49-F238E27FC236}">
-                    <a16:creationId xmlns:a16="http://schemas.microsoft.com/office/drawing/2014/main" id="{F5605711-4C17-7D12-676E-3527CC168389}"/>
+                    <a16:creationId xmlns:a16="http://schemas.microsoft.com/office/drawing/2014/main" id="{E0776CBD-83CA-D3BF-A3FF-D5FF11987996}"/>
+                  </a:ext>
+                </a:extLst>
+              </p:cNvPr>
+              <p:cNvPicPr>
+                <a:picLocks noGrp="1" noRot="1" noChangeAspect="1" noMove="1" noResize="1" noEditPoints="1" noAdjustHandles="1" noChangeArrowheads="1" noChangeShapeType="1"/>
+              </p:cNvPicPr>
+              <p:nvPr/>
+            </p:nvPicPr>
+            <p:blipFill>
+              <a:blip r:embed="rId5"/>
+              <a:stretch>
+                <a:fillRect/>
+              </a:stretch>
+            </p:blipFill>
+            <p:spPr>
+              <a:xfrm rot="10800000">
+                <a:off x="5338800" y="1969200"/>
+                <a:ext cx="3301200" cy="3188390"/>
+              </a:xfrm>
+              <a:prstGeom prst="rect">
+                <a:avLst/>
+              </a:prstGeom>
+              <a:effectLst/>
+            </p:spPr>
+          </p:pic>
+        </mc:Fallback>
+      </mc:AlternateContent>
+      <mc:AlternateContent xmlns:mc="http://schemas.openxmlformats.org/markup-compatibility/2006">
+        <mc:Choice xmlns:pslz="http://schemas.microsoft.com/office/powerpoint/2016/slidezoom" Requires="pslz">
+          <p:graphicFrame>
+            <p:nvGraphicFramePr>
+              <p:cNvPr id="12" name="Slide Zoom 11">
+                <a:extLst>
+                  <a:ext uri="{FF2B5EF4-FFF2-40B4-BE49-F238E27FC236}">
+                    <a16:creationId xmlns:a16="http://schemas.microsoft.com/office/drawing/2014/main" id="{99CFB7FD-C9C6-936B-E5A9-035BFB4A2D42}"/>
+                  </a:ext>
+                </a:extLst>
+              </p:cNvPr>
+              <p:cNvGraphicFramePr>
+                <a:graphicFrameLocks noChangeAspect="1"/>
+              </p:cNvGraphicFramePr>
+              <p:nvPr>
+                <p:extLst>
+                  <p:ext uri="{D42A27DB-BD31-4B8C-83A1-F6EECF244321}">
+                    <p14:modId xmlns:p14="http://schemas.microsoft.com/office/powerpoint/2010/main" val="1207151776"/>
+                  </p:ext>
+                </p:extLst>
+              </p:nvPr>
+            </p:nvGraphicFramePr>
+            <p:xfrm rot="10800000">
+              <a:off x="1018800" y="5158800"/>
+              <a:ext cx="3301200" cy="3188390"/>
+            </p:xfrm>
+            <a:graphic>
+              <a:graphicData uri="http://schemas.microsoft.com/office/powerpoint/2016/slidezoom">
+                <pslz:sldZm>
+                  <pslz:sldZmObj sldId="256" cId="1770594053">
+                    <pslz:zmPr id="{A7A323EF-EDCA-1842-93C1-732DEC9324FE}" returnToParent="0" transitionDur="1000" showBg="0">
+                      <p166:blipFill xmlns:p166="http://schemas.microsoft.com/office/powerpoint/2016/6/main">
+                        <a:blip r:embed="rId6"/>
+                        <a:stretch>
+                          <a:fillRect/>
+                        </a:stretch>
+                      </p166:blipFill>
+                      <p166:spPr xmlns:p166="http://schemas.microsoft.com/office/powerpoint/2016/6/main">
+                        <a:xfrm rot="10800000">
+                          <a:off x="0" y="0"/>
+                          <a:ext cx="3301200" cy="3188390"/>
+                        </a:xfrm>
+                        <a:prstGeom prst="rect">
+                          <a:avLst/>
+                        </a:prstGeom>
+                        <a:effectLst/>
+                      </p166:spPr>
+                    </pslz:zmPr>
+                  </pslz:sldZmObj>
+                </pslz:sldZm>
+              </a:graphicData>
+            </a:graphic>
+          </p:graphicFrame>
+        </mc:Choice>
+        <mc:Fallback>
+          <p:pic>
+            <p:nvPicPr>
+              <p:cNvPr id="12" name="Slide Zoom 11">
+                <a:hlinkClick r:id="rId3" action="ppaction://hlinksldjump"/>
+                <a:extLst>
+                  <a:ext uri="{FF2B5EF4-FFF2-40B4-BE49-F238E27FC236}">
+                    <a16:creationId xmlns:a16="http://schemas.microsoft.com/office/drawing/2014/main" id="{99CFB7FD-C9C6-936B-E5A9-035BFB4A2D42}"/>
                   </a:ext>
                 </a:extLst>
               </p:cNvPr>
@@ -3137,9 +3315,9 @@
               </a:stretch>
             </p:blipFill>
             <p:spPr>
-              <a:xfrm flipV="1">
-                <a:off x="1404094" y="4451469"/>
-                <a:ext cx="3240000" cy="3240000"/>
+              <a:xfrm rot="10800000">
+                <a:off x="1018800" y="5158800"/>
+                <a:ext cx="3301200" cy="3188390"/>
               </a:xfrm>
               <a:prstGeom prst="rect">
                 <a:avLst/>
@@ -3149,14 +3327,14 @@
           </p:pic>
         </mc:Fallback>
       </mc:AlternateContent>
-      <mc:AlternateContent xmlns:mc="http://schemas.openxmlformats.org/markup-compatibility/2006" xmlns:pslz="http://schemas.microsoft.com/office/powerpoint/2016/slidezoom">
-        <mc:Choice Requires="pslz">
+      <mc:AlternateContent xmlns:mc="http://schemas.openxmlformats.org/markup-compatibility/2006">
+        <mc:Choice xmlns:pslz="http://schemas.microsoft.com/office/powerpoint/2016/slidezoom" Requires="pslz">
           <p:graphicFrame>
             <p:nvGraphicFramePr>
-              <p:cNvPr id="9" name="Slide Zoom 8">
+              <p:cNvPr id="13" name="Slide Zoom 12">
                 <a:extLst>
                   <a:ext uri="{FF2B5EF4-FFF2-40B4-BE49-F238E27FC236}">
-                    <a16:creationId xmlns:a16="http://schemas.microsoft.com/office/drawing/2014/main" id="{8C06F37C-8236-5F54-DB78-C84C381DDD75}"/>
+                    <a16:creationId xmlns:a16="http://schemas.microsoft.com/office/drawing/2014/main" id="{BFDB06B9-A766-F8ED-26DA-7FB0B4780B01}"/>
                   </a:ext>
                 </a:extLst>
               </p:cNvPr>
@@ -3166,20 +3344,20 @@
               <p:nvPr>
                 <p:extLst>
                   <p:ext uri="{D42A27DB-BD31-4B8C-83A1-F6EECF244321}">
-                    <p14:modId xmlns:p14="http://schemas.microsoft.com/office/powerpoint/2010/main" val="3477096514"/>
+                    <p14:modId xmlns:p14="http://schemas.microsoft.com/office/powerpoint/2010/main" val="386731958"/>
                   </p:ext>
                 </p:extLst>
               </p:nvPr>
             </p:nvGraphicFramePr>
-            <p:xfrm flipV="1">
-              <a:off x="4866235" y="2052000"/>
-              <a:ext cx="3240000" cy="3240000"/>
+            <p:xfrm rot="10800000">
+              <a:off x="4320000" y="5158800"/>
+              <a:ext cx="3301200" cy="3188390"/>
             </p:xfrm>
             <a:graphic>
               <a:graphicData uri="http://schemas.microsoft.com/office/powerpoint/2016/slidezoom">
                 <pslz:sldZm>
                   <pslz:sldZmObj sldId="256" cId="1770594053">
-                    <pslz:zmPr id="{DEB289BA-851F-E94E-B758-5CF50B5A79ED}" returnToParent="0" transitionDur="1000" showBg="0">
+                    <pslz:zmPr id="{A7A323EF-EDCA-1842-93C1-732DEC9324FE}" returnToParent="0" transitionDur="1000" showBg="0">
                       <p166:blipFill xmlns:p166="http://schemas.microsoft.com/office/powerpoint/2016/6/main">
                         <a:blip r:embed="rId7"/>
                         <a:stretch>
@@ -3187,9 +3365,9 @@
                         </a:stretch>
                       </p166:blipFill>
                       <p166:spPr xmlns:p166="http://schemas.microsoft.com/office/powerpoint/2016/6/main">
-                        <a:xfrm flipV="1">
+                        <a:xfrm rot="10800000">
                           <a:off x="0" y="0"/>
-                          <a:ext cx="3240000" cy="3240000"/>
+                          <a:ext cx="3301200" cy="3188390"/>
                         </a:xfrm>
                         <a:prstGeom prst="rect">
                           <a:avLst/>
@@ -3203,14 +3381,14 @@
             </a:graphic>
           </p:graphicFrame>
         </mc:Choice>
-        <mc:Fallback xmlns="">
+        <mc:Fallback>
           <p:pic>
             <p:nvPicPr>
-              <p:cNvPr id="9" name="Slide Zoom 8">
+              <p:cNvPr id="13" name="Slide Zoom 12">
                 <a:hlinkClick r:id="rId3" action="ppaction://hlinksldjump"/>
                 <a:extLst>
                   <a:ext uri="{FF2B5EF4-FFF2-40B4-BE49-F238E27FC236}">
-                    <a16:creationId xmlns:a16="http://schemas.microsoft.com/office/drawing/2014/main" id="{8C06F37C-8236-5F54-DB78-C84C381DDD75}"/>
+                    <a16:creationId xmlns:a16="http://schemas.microsoft.com/office/drawing/2014/main" id="{BFDB06B9-A766-F8ED-26DA-7FB0B4780B01}"/>
                   </a:ext>
                 </a:extLst>
               </p:cNvPr>
@@ -3220,15 +3398,15 @@
               <p:nvPr/>
             </p:nvPicPr>
             <p:blipFill>
-              <a:blip r:embed="rId8"/>
+              <a:blip r:embed="rId7"/>
               <a:stretch>
                 <a:fillRect/>
               </a:stretch>
             </p:blipFill>
             <p:spPr>
-              <a:xfrm flipV="1">
-                <a:off x="4866235" y="2052000"/>
-                <a:ext cx="3240000" cy="3240000"/>
+              <a:xfrm rot="10800000">
+                <a:off x="4320000" y="5158800"/>
+                <a:ext cx="3301200" cy="3188390"/>
               </a:xfrm>
               <a:prstGeom prst="rect">
                 <a:avLst/>
@@ -3238,190 +3416,12 @@
           </p:pic>
         </mc:Fallback>
       </mc:AlternateContent>
-      <mc:AlternateContent xmlns:mc="http://schemas.openxmlformats.org/markup-compatibility/2006" xmlns:pslz="http://schemas.microsoft.com/office/powerpoint/2016/slidezoom">
-        <mc:Choice Requires="pslz">
-          <p:graphicFrame>
-            <p:nvGraphicFramePr>
-              <p:cNvPr id="10" name="Slide Zoom 9">
-                <a:extLst>
-                  <a:ext uri="{FF2B5EF4-FFF2-40B4-BE49-F238E27FC236}">
-                    <a16:creationId xmlns:a16="http://schemas.microsoft.com/office/drawing/2014/main" id="{C01F10D6-00FC-7672-FE24-E8755CFDDCB6}"/>
-                  </a:ext>
-                </a:extLst>
-              </p:cNvPr>
-              <p:cNvGraphicFramePr>
-                <a:graphicFrameLocks noChangeAspect="1"/>
-              </p:cNvGraphicFramePr>
-              <p:nvPr>
-                <p:extLst>
-                  <p:ext uri="{D42A27DB-BD31-4B8C-83A1-F6EECF244321}">
-                    <p14:modId xmlns:p14="http://schemas.microsoft.com/office/powerpoint/2010/main" val="2819766068"/>
-                  </p:ext>
-                </p:extLst>
-              </p:nvPr>
-            </p:nvGraphicFramePr>
-            <p:xfrm flipV="1">
-              <a:off x="555389" y="2052017"/>
-              <a:ext cx="3240000" cy="3240000"/>
-            </p:xfrm>
-            <a:graphic>
-              <a:graphicData uri="http://schemas.microsoft.com/office/powerpoint/2016/slidezoom">
-                <pslz:sldZm>
-                  <pslz:sldZmObj sldId="256" cId="1770594053">
-                    <pslz:zmPr id="{DEB289BA-851F-E94E-B758-5CF50B5A79ED}" returnToParent="0" transitionDur="1000" showBg="0">
-                      <p166:blipFill xmlns:p166="http://schemas.microsoft.com/office/powerpoint/2016/6/main">
-                        <a:blip r:embed="rId9"/>
-                        <a:stretch>
-                          <a:fillRect/>
-                        </a:stretch>
-                      </p166:blipFill>
-                      <p166:spPr xmlns:p166="http://schemas.microsoft.com/office/powerpoint/2016/6/main">
-                        <a:xfrm flipV="1">
-                          <a:off x="0" y="0"/>
-                          <a:ext cx="3240000" cy="3240000"/>
-                        </a:xfrm>
-                        <a:prstGeom prst="rect">
-                          <a:avLst/>
-                        </a:prstGeom>
-                        <a:effectLst/>
-                      </p166:spPr>
-                    </pslz:zmPr>
-                  </pslz:sldZmObj>
-                </pslz:sldZm>
-              </a:graphicData>
-            </a:graphic>
-          </p:graphicFrame>
-        </mc:Choice>
-        <mc:Fallback xmlns="">
-          <p:pic>
-            <p:nvPicPr>
-              <p:cNvPr id="10" name="Slide Zoom 9">
-                <a:hlinkClick r:id="rId3" action="ppaction://hlinksldjump"/>
-                <a:extLst>
-                  <a:ext uri="{FF2B5EF4-FFF2-40B4-BE49-F238E27FC236}">
-                    <a16:creationId xmlns:a16="http://schemas.microsoft.com/office/drawing/2014/main" id="{C01F10D6-00FC-7672-FE24-E8755CFDDCB6}"/>
-                  </a:ext>
-                </a:extLst>
-              </p:cNvPr>
-              <p:cNvPicPr>
-                <a:picLocks noGrp="1" noRot="1" noChangeAspect="1" noMove="1" noResize="1" noEditPoints="1" noAdjustHandles="1" noChangeArrowheads="1" noChangeShapeType="1"/>
-              </p:cNvPicPr>
-              <p:nvPr/>
-            </p:nvPicPr>
-            <p:blipFill>
-              <a:blip r:embed="rId10"/>
-              <a:stretch>
-                <a:fillRect/>
-              </a:stretch>
-            </p:blipFill>
-            <p:spPr>
-              <a:xfrm flipV="1">
-                <a:off x="555389" y="2052017"/>
-                <a:ext cx="3240000" cy="3240000"/>
-              </a:xfrm>
-              <a:prstGeom prst="rect">
-                <a:avLst/>
-              </a:prstGeom>
-              <a:effectLst/>
-            </p:spPr>
-          </p:pic>
-        </mc:Fallback>
-      </mc:AlternateContent>
-      <mc:AlternateContent xmlns:mc="http://schemas.openxmlformats.org/markup-compatibility/2006" xmlns:pslz="http://schemas.microsoft.com/office/powerpoint/2016/slidezoom">
-        <mc:Choice Requires="pslz">
-          <p:graphicFrame>
-            <p:nvGraphicFramePr>
-              <p:cNvPr id="6" name="Slide Zoom 5">
-                <a:extLst>
-                  <a:ext uri="{FF2B5EF4-FFF2-40B4-BE49-F238E27FC236}">
-                    <a16:creationId xmlns:a16="http://schemas.microsoft.com/office/drawing/2014/main" id="{A22F8780-BF9F-8826-BC63-99A279098262}"/>
-                  </a:ext>
-                </a:extLst>
-              </p:cNvPr>
-              <p:cNvGraphicFramePr>
-                <a:graphicFrameLocks noChangeAspect="1"/>
-              </p:cNvGraphicFramePr>
-              <p:nvPr>
-                <p:extLst>
-                  <p:ext uri="{D42A27DB-BD31-4B8C-83A1-F6EECF244321}">
-                    <p14:modId xmlns:p14="http://schemas.microsoft.com/office/powerpoint/2010/main" val="1912857949"/>
-                  </p:ext>
-                </p:extLst>
-              </p:nvPr>
-            </p:nvGraphicFramePr>
-            <p:xfrm flipV="1">
-              <a:off x="2726894" y="481023"/>
-              <a:ext cx="3240000" cy="3240000"/>
-            </p:xfrm>
-            <a:graphic>
-              <a:graphicData uri="http://schemas.microsoft.com/office/powerpoint/2016/slidezoom">
-                <pslz:sldZm>
-                  <pslz:sldZmObj sldId="256" cId="1770594053">
-                    <pslz:zmPr id="{DEB289BA-851F-E94E-B758-5CF50B5A79ED}" returnToParent="0" transitionDur="1000" showBg="0">
-                      <p166:blipFill xmlns:p166="http://schemas.microsoft.com/office/powerpoint/2016/6/main">
-                        <a:blip r:embed="rId11"/>
-                        <a:stretch>
-                          <a:fillRect/>
-                        </a:stretch>
-                      </p166:blipFill>
-                      <p166:spPr xmlns:p166="http://schemas.microsoft.com/office/powerpoint/2016/6/main">
-                        <a:xfrm flipV="1">
-                          <a:off x="0" y="0"/>
-                          <a:ext cx="3240000" cy="3240000"/>
-                        </a:xfrm>
-                        <a:prstGeom prst="rect">
-                          <a:avLst/>
-                        </a:prstGeom>
-                        <a:effectLst/>
-                      </p166:spPr>
-                    </pslz:zmPr>
-                  </pslz:sldZmObj>
-                </pslz:sldZm>
-              </a:graphicData>
-            </a:graphic>
-          </p:graphicFrame>
-        </mc:Choice>
-        <mc:Fallback xmlns="">
-          <p:pic>
-            <p:nvPicPr>
-              <p:cNvPr id="6" name="Slide Zoom 5">
-                <a:hlinkClick r:id="rId3" action="ppaction://hlinksldjump"/>
-                <a:extLst>
-                  <a:ext uri="{FF2B5EF4-FFF2-40B4-BE49-F238E27FC236}">
-                    <a16:creationId xmlns:a16="http://schemas.microsoft.com/office/drawing/2014/main" id="{A22F8780-BF9F-8826-BC63-99A279098262}"/>
-                  </a:ext>
-                </a:extLst>
-              </p:cNvPr>
-              <p:cNvPicPr>
-                <a:picLocks noGrp="1" noRot="1" noChangeAspect="1" noMove="1" noResize="1" noEditPoints="1" noAdjustHandles="1" noChangeArrowheads="1" noChangeShapeType="1"/>
-              </p:cNvPicPr>
-              <p:nvPr/>
-            </p:nvPicPr>
-            <p:blipFill>
-              <a:blip r:embed="rId12"/>
-              <a:stretch>
-                <a:fillRect/>
-              </a:stretch>
-            </p:blipFill>
-            <p:spPr>
-              <a:xfrm flipV="1">
-                <a:off x="2726894" y="481023"/>
-                <a:ext cx="3240000" cy="3240000"/>
-              </a:xfrm>
-              <a:prstGeom prst="rect">
-                <a:avLst/>
-              </a:prstGeom>
-              <a:effectLst/>
-            </p:spPr>
-          </p:pic>
-        </mc:Fallback>
-      </mc:AlternateContent>
       <p:sp>
         <p:nvSpPr>
           <p:cNvPr id="2" name="Oval 1">
             <a:extLst>
               <a:ext uri="{FF2B5EF4-FFF2-40B4-BE49-F238E27FC236}">
-                <a16:creationId xmlns:a16="http://schemas.microsoft.com/office/drawing/2014/main" id="{7748A845-9C66-89A9-3403-2CFEAB5FEE69}"/>
+                <a16:creationId xmlns:a16="http://schemas.microsoft.com/office/drawing/2014/main" id="{DDB9C679-D739-C548-4678-2E20A1AA3DCF}"/>
               </a:ext>
             </a:extLst>
           </p:cNvPr>
@@ -3430,19 +3430,42 @@
         </p:nvSpPr>
         <p:spPr>
           <a:xfrm>
-            <a:off x="2112588" y="2050762"/>
-            <a:ext cx="4502422" cy="4502422"/>
+            <a:off x="1440000" y="1477900"/>
+            <a:ext cx="5760000" cy="5760000"/>
           </a:xfrm>
           <a:prstGeom prst="ellipse">
             <a:avLst/>
           </a:prstGeom>
-          <a:solidFill>
-            <a:srgbClr val="C00000">
-              <a:alpha val="20000"/>
-            </a:srgbClr>
-          </a:solidFill>
+          <a:gradFill>
+            <a:gsLst>
+              <a:gs pos="0">
+                <a:schemeClr val="accent1">
+                  <a:lumMod val="5000"/>
+                  <a:lumOff val="95000"/>
+                  <a:alpha val="25000"/>
+                </a:schemeClr>
+              </a:gs>
+              <a:gs pos="90000">
+                <a:srgbClr val="C00000">
+                  <a:alpha val="75000"/>
+                </a:srgbClr>
+              </a:gs>
+              <a:gs pos="100000">
+                <a:srgbClr val="C00000">
+                  <a:alpha val="90000"/>
+                </a:srgbClr>
+              </a:gs>
+            </a:gsLst>
+            <a:path path="circle">
+              <a:fillToRect l="50000" t="50000" r="50000" b="50000"/>
+            </a:path>
+          </a:gradFill>
           <a:ln>
-            <a:noFill/>
+            <a:solidFill>
+              <a:srgbClr val="C00000">
+                <a:alpha val="15000"/>
+              </a:srgbClr>
+            </a:solidFill>
           </a:ln>
         </p:spPr>
         <p:style>

</xml_diff>